<commit_message>
Create Slide AI Text Using ChatGPT
</commit_message>
<xml_diff>
--- a/DALLE_PPT/my_presentation.pptx
+++ b/DALLE_PPT/my_presentation.pptx
@@ -4,6 +4,9 @@
   <p:sldMasterIdLst>
     <p:sldMasterId id="2147483648" r:id="rId1"/>
   </p:sldMasterIdLst>
+  <p:sldIdLst>
+    <p:sldId id="256" r:id="rId7"/>
+  </p:sldIdLst>
   <p:sldSz cx="24384000" cy="13716000" type="screen4x3"/>
   <p:notesSz cx="6858000" cy="9144000"/>
   <p:defaultTextStyle>
@@ -3073,6 +3076,154 @@
     </p:otherStyle>
   </p:txStyles>
 </p:sldMaster>
+</file>
+
+<file path=ppt/slides/slide1.xml><?xml version="1.0" encoding="utf-8"?>
+<p:sld xmlns:a="http://schemas.openxmlformats.org/drawingml/2006/main" xmlns:p="http://schemas.openxmlformats.org/presentationml/2006/main" xmlns:r="http://schemas.openxmlformats.org/officeDocument/2006/relationships">
+  <p:cSld>
+    <p:spTree>
+      <p:nvGrpSpPr>
+        <p:cNvPr id="1" name=""/>
+        <p:cNvGrpSpPr/>
+        <p:nvPr/>
+      </p:nvGrpSpPr>
+      <p:grpSpPr/>
+      <p:sp>
+        <p:nvSpPr>
+          <p:cNvPr id="2" name="Title 1"/>
+          <p:cNvSpPr>
+            <a:spLocks noGrp="1"/>
+          </p:cNvSpPr>
+          <p:nvPr>
+            <p:ph type="title"/>
+          </p:nvPr>
+        </p:nvSpPr>
+        <p:spPr/>
+        <p:txBody>
+          <a:bodyPr/>
+          <a:lstStyle/>
+          <a:p/>
+          <a:p>
+            <a:r>
+              <a:t>Exploring the Benefits of Collaborative Working</a:t>
+            </a:r>
+          </a:p>
+          <a:p/>
+          <a:p>
+            <a:r>
+              <a:t>"Unlock the Potential of Collaborative Working"</a:t>
+            </a:r>
+          </a:p>
+        </p:txBody>
+      </p:sp>
+      <p:sp>
+        <p:nvSpPr>
+          <p:cNvPr id="3" name="Content Placeholder 2"/>
+          <p:cNvSpPr>
+            <a:spLocks noGrp="1"/>
+          </p:cNvSpPr>
+          <p:nvPr>
+            <p:ph idx="1"/>
+          </p:nvPr>
+        </p:nvSpPr>
+        <p:spPr/>
+        <p:txBody>
+          <a:bodyPr/>
+          <a:lstStyle/>
+          <a:p/>
+        </p:txBody>
+      </p:sp>
+      <p:pic>
+        <p:nvPicPr>
+          <p:cNvPr id="4" name="Picture 3" descr="image.png"/>
+          <p:cNvPicPr>
+            <a:picLocks noChangeAspect="1"/>
+          </p:cNvPicPr>
+          <p:nvPr/>
+        </p:nvPicPr>
+        <p:blipFill>
+          <a:blip r:embed="rId2"/>
+          <a:stretch>
+            <a:fillRect/>
+          </a:stretch>
+        </p:blipFill>
+        <p:spPr>
+          <a:xfrm>
+            <a:off x="914400" y="914400"/>
+            <a:ext cx="13004800" cy="13004800"/>
+          </a:xfrm>
+          <a:prstGeom prst="rect">
+            <a:avLst/>
+          </a:prstGeom>
+        </p:spPr>
+      </p:pic>
+      <p:sp>
+        <p:nvSpPr>
+          <p:cNvPr id="5" name="TextBox 4"/>
+          <p:cNvSpPr txBox="1"/>
+          <p:nvPr/>
+        </p:nvSpPr>
+        <p:spPr>
+          <a:xfrm>
+            <a:off x="2743200" y="914400"/>
+            <a:ext cx="3657600" cy="1371600"/>
+          </a:xfrm>
+          <a:prstGeom prst="rect">
+            <a:avLst/>
+          </a:prstGeom>
+          <a:noFill/>
+        </p:spPr>
+        <p:txBody>
+          <a:bodyPr wrap="none">
+            <a:spAutoFit/>
+          </a:bodyPr>
+          <a:lstStyle/>
+          <a:p/>
+          <a:p/>
+          <a:p>
+            <a:r>
+              <a:t>The benefits of using renewable energy</a:t>
+            </a:r>
+          </a:p>
+          <a:p/>
+          <a:p>
+            <a:r>
+              <a:t>- Potential to significantly reduce emissions </a:t>
+            </a:r>
+          </a:p>
+          <a:p>
+            <a:r>
+              <a:t>- Cost-effective in the long run </a:t>
+            </a:r>
+          </a:p>
+          <a:p>
+            <a:r>
+              <a:t>- Low impact on the environment</a:t>
+            </a:r>
+          </a:p>
+          <a:p>
+            <a:r>
+              <a:t>- Reliable and secure </a:t>
+            </a:r>
+          </a:p>
+          <a:p>
+            <a:r>
+              <a:t>- Helps achieve targets for renewable energy generation </a:t>
+            </a:r>
+          </a:p>
+          <a:p>
+            <a:r>
+              <a:t>- Creates jobs and boosts local economies</a:t>
+            </a:r>
+          </a:p>
+        </p:txBody>
+      </p:sp>
+    </p:spTree>
+  </p:cSld>
+  <p:clrMapOvr>
+    <a:masterClrMapping/>
+  </p:clrMapOvr>
+</p:sld>
 </file>
 
 <file path=ppt/theme/theme1.xml><?xml version="1.0" encoding="utf-8"?>

</xml_diff>